<commit_message>
Added errorbar reading and added consistency across plot style documents
</commit_message>
<xml_diff>
--- a/notebooks/figure_prep/figures-5.1-subplots.pptx
+++ b/notebooks/figure_prep/figures-5.1-subplots.pptx
@@ -3323,6 +3323,60 @@
       </p:grpSpPr>
       <p:sp>
         <p:nvSpPr>
+          <p:cNvPr id="30" name="Rectangle 29">
+            <a:extLst>
+              <a:ext uri="{FF2B5EF4-FFF2-40B4-BE49-F238E27FC236}">
+                <a16:creationId xmlns:a16="http://schemas.microsoft.com/office/drawing/2014/main" id="{B786E80C-7A60-4B07-1E77-0765F7A9BCC3}"/>
+              </a:ext>
+            </a:extLst>
+          </p:cNvPr>
+          <p:cNvSpPr/>
+          <p:nvPr/>
+        </p:nvSpPr>
+        <p:spPr>
+          <a:xfrm>
+            <a:off x="1730828" y="312584"/>
+            <a:ext cx="5658175" cy="5467730"/>
+          </a:xfrm>
+          <a:prstGeom prst="rect">
+            <a:avLst/>
+          </a:prstGeom>
+          <a:solidFill>
+            <a:schemeClr val="bg1"/>
+          </a:solidFill>
+          <a:ln>
+            <a:solidFill>
+              <a:schemeClr val="bg1"/>
+            </a:solidFill>
+          </a:ln>
+        </p:spPr>
+        <p:style>
+          <a:lnRef idx="2">
+            <a:schemeClr val="accent1">
+              <a:shade val="15000"/>
+            </a:schemeClr>
+          </a:lnRef>
+          <a:fillRef idx="1">
+            <a:schemeClr val="accent1"/>
+          </a:fillRef>
+          <a:effectRef idx="0">
+            <a:schemeClr val="accent1"/>
+          </a:effectRef>
+          <a:fontRef idx="minor">
+            <a:schemeClr val="lt1"/>
+          </a:fontRef>
+        </p:style>
+        <p:txBody>
+          <a:bodyPr rtlCol="0" anchor="ctr"/>
+          <a:lstStyle/>
+          <a:p>
+            <a:pPr algn="ctr"/>
+            <a:endParaRPr lang="en-US" dirty="0"/>
+          </a:p>
+        </p:txBody>
+      </p:sp>
+      <p:sp>
+        <p:nvSpPr>
           <p:cNvPr id="4" name="Rectangle 3">
             <a:extLst>
               <a:ext uri="{FF2B5EF4-FFF2-40B4-BE49-F238E27FC236}">
@@ -3556,7 +3610,7 @@
         <p:spPr>
           <a:xfrm>
             <a:off x="2049201" y="5090420"/>
-            <a:ext cx="1063730" cy="596020"/>
+            <a:ext cx="659155" cy="369332"/>
           </a:xfrm>
           <a:prstGeom prst="rect">
             <a:avLst/>
@@ -3572,10 +3626,7 @@
             <a:r>
               <a:rPr lang="en-US" dirty="0">
                 <a:solidFill>
-                  <a:schemeClr val="tx1">
-                    <a:lumMod val="50000"/>
-                    <a:lumOff val="50000"/>
-                  </a:schemeClr>
+                  <a:srgbClr val="00B050"/>
                 </a:solidFill>
                 <a:latin typeface="Arial" panose="020B0604020202020204" pitchFamily="34" charset="0"/>
                 <a:cs typeface="Arial" panose="020B0604020202020204" pitchFamily="34" charset="0"/>
@@ -3600,7 +3651,7 @@
         <p:spPr>
           <a:xfrm>
             <a:off x="2049201" y="3275596"/>
-            <a:ext cx="1374156" cy="596020"/>
+            <a:ext cx="851515" cy="369332"/>
           </a:xfrm>
           <a:prstGeom prst="rect">
             <a:avLst/>
@@ -3616,10 +3667,7 @@
             <a:r>
               <a:rPr lang="en-US" dirty="0">
                 <a:solidFill>
-                  <a:schemeClr val="tx1">
-                    <a:lumMod val="50000"/>
-                    <a:lumOff val="50000"/>
-                  </a:schemeClr>
+                  <a:srgbClr val="00B050"/>
                 </a:solidFill>
                 <a:latin typeface="Arial" panose="020B0604020202020204" pitchFamily="34" charset="0"/>
                 <a:cs typeface="Arial" panose="020B0604020202020204" pitchFamily="34" charset="0"/>
@@ -3644,7 +3692,7 @@
         <p:spPr>
           <a:xfrm>
             <a:off x="3997603" y="3275596"/>
-            <a:ext cx="1684584" cy="596020"/>
+            <a:ext cx="1043876" cy="369332"/>
           </a:xfrm>
           <a:prstGeom prst="rect">
             <a:avLst/>
@@ -3660,10 +3708,7 @@
             <a:r>
               <a:rPr lang="en-US" dirty="0">
                 <a:solidFill>
-                  <a:schemeClr val="tx1">
-                    <a:lumMod val="50000"/>
-                    <a:lumOff val="50000"/>
-                  </a:schemeClr>
+                  <a:srgbClr val="00B050"/>
                 </a:solidFill>
                 <a:latin typeface="Arial" panose="020B0604020202020204" pitchFamily="34" charset="0"/>
                 <a:cs typeface="Arial" panose="020B0604020202020204" pitchFamily="34" charset="0"/>
@@ -3687,8 +3732,8 @@
         </p:nvSpPr>
         <p:spPr>
           <a:xfrm>
-            <a:off x="4090383" y="5090420"/>
-            <a:ext cx="1374156" cy="596020"/>
+            <a:off x="4025067" y="5090420"/>
+            <a:ext cx="851515" cy="369332"/>
           </a:xfrm>
           <a:prstGeom prst="rect">
             <a:avLst/>
@@ -3704,10 +3749,7 @@
             <a:r>
               <a:rPr lang="en-US" dirty="0">
                 <a:solidFill>
-                  <a:schemeClr val="tx1">
-                    <a:lumMod val="50000"/>
-                    <a:lumOff val="50000"/>
-                  </a:schemeClr>
+                  <a:srgbClr val="00B050"/>
                 </a:solidFill>
                 <a:latin typeface="Arial" panose="020B0604020202020204" pitchFamily="34" charset="0"/>
                 <a:cs typeface="Arial" panose="020B0604020202020204" pitchFamily="34" charset="0"/>

</xml_diff>